<commit_message>
Well, the prez was updated.
</commit_message>
<xml_diff>
--- a/CCSU Hackathon.pptx
+++ b/CCSU Hackathon.pptx
@@ -10,6 +10,7 @@
     <p:sldId id="258" r:id="rId4"/>
     <p:sldId id="259" r:id="rId5"/>
     <p:sldId id="260" r:id="rId6"/>
+    <p:sldId id="261" r:id="rId7"/>
   </p:sldIdLst>
   <p:sldSz cx="12192000" cy="6858000"/>
   <p:notesSz cx="6858000" cy="9144000"/>
@@ -108,6 +109,11 @@
       </a:defRPr>
     </a:lvl9pPr>
   </p:defaultTextStyle>
+  <p:extLst>
+    <p:ext uri="{EFAFB233-063F-42B5-8137-9DF3F51BA10A}">
+      <p15:sldGuideLst xmlns:p15="http://schemas.microsoft.com/office/powerpoint/2012/main"/>
+    </p:ext>
+  </p:extLst>
 </p:presentation>
 </file>
 
@@ -6152,21 +6158,21 @@
             <p:ph type="ctrTitle"/>
           </p:nvPr>
         </p:nvSpPr>
-        <p:spPr/>
-        <p:txBody>
-          <a:bodyPr/>
+        <p:spPr>
+          <a:xfrm>
+            <a:off x="3084919" y="383290"/>
+            <a:ext cx="8574622" cy="1898591"/>
+          </a:xfrm>
+        </p:spPr>
+        <p:txBody>
+          <a:bodyPr>
+            <a:normAutofit/>
+          </a:bodyPr>
           <a:lstStyle/>
           <a:p>
             <a:r>
-              <a:rPr lang="en-US" dirty="0"/>
+              <a:rPr lang="en-US" sz="7200" b="1" dirty="0"/>
               <a:t>CCSU Hackathon</a:t>
-            </a:r>
-            <a:br>
-              <a:rPr lang="en-US" dirty="0"/>
-            </a:br>
-            <a:r>
-              <a:rPr lang="en-US" dirty="0"/>
-              <a:t>Team Panda</a:t>
             </a:r>
           </a:p>
         </p:txBody>
@@ -6187,30 +6193,50 @@
             <p:ph type="subTitle" idx="1"/>
           </p:nvPr>
         </p:nvSpPr>
-        <p:spPr/>
-        <p:txBody>
-          <a:bodyPr/>
+        <p:spPr>
+          <a:xfrm>
+            <a:off x="4886080" y="5277935"/>
+            <a:ext cx="6987645" cy="1388534"/>
+          </a:xfrm>
+        </p:spPr>
+        <p:txBody>
+          <a:bodyPr>
+            <a:normAutofit lnSpcReduction="10000"/>
+          </a:bodyPr>
           <a:lstStyle/>
           <a:p>
             <a:r>
+              <a:rPr lang="en-US" b="1" dirty="0"/>
+              <a:t>Group Members: </a:t>
+            </a:r>
+            <a:r>
               <a:rPr lang="en-US" dirty="0"/>
-              <a:t>Group Members: William </a:t>
-            </a:r>
-            <a:r>
-              <a:rPr lang="en-US" dirty="0" err="1"/>
-              <a:t>Paskewitz</a:t>
-            </a:r>
-            <a:r>
+              <a:t>William Paskewitz</a:t>
+            </a:r>
+            <a:br>
               <a:rPr lang="en-US" dirty="0"/>
-              <a:t>, Nick </a:t>
+            </a:br>
+            <a:r>
+              <a:rPr lang="en-US" dirty="0"/>
+              <a:t> Nick </a:t>
             </a:r>
             <a:r>
               <a:rPr lang="en-US" dirty="0" err="1"/>
               <a:t>Podgorski</a:t>
             </a:r>
-            <a:r>
+            <a:br>
               <a:rPr lang="en-US" dirty="0"/>
-              <a:t>, Phil, Michael Brouwer</a:t>
+            </a:br>
+            <a:r>
+              <a:rPr lang="en-US" dirty="0"/>
+              <a:t>Philip Murray</a:t>
+            </a:r>
+            <a:br>
+              <a:rPr lang="en-US" dirty="0"/>
+            </a:br>
+            <a:r>
+              <a:rPr lang="en-US" dirty="0"/>
+              <a:t>Michael Brouwer</a:t>
             </a:r>
           </a:p>
           <a:p>
@@ -6218,6 +6244,42 @@
           </a:p>
         </p:txBody>
       </p:sp>
+      <p:pic>
+        <p:nvPicPr>
+          <p:cNvPr id="5" name="Picture 4">
+            <a:extLst>
+              <a:ext uri="{FF2B5EF4-FFF2-40B4-BE49-F238E27FC236}">
+                <a16:creationId xmlns:a16="http://schemas.microsoft.com/office/drawing/2014/main" id="{2A955606-55F6-4C91-BB09-7AAD27F0B7A2}"/>
+              </a:ext>
+            </a:extLst>
+          </p:cNvPr>
+          <p:cNvPicPr>
+            <a:picLocks noChangeAspect="1"/>
+          </p:cNvPicPr>
+          <p:nvPr/>
+        </p:nvPicPr>
+        <p:blipFill>
+          <a:blip r:embed="rId2">
+            <a:extLst>
+              <a:ext uri="{28A0092B-C50C-407E-A947-70E740481C1C}">
+                <a14:useLocalDpi xmlns:a14="http://schemas.microsoft.com/office/drawing/2010/main" val="0"/>
+              </a:ext>
+            </a:extLst>
+          </a:blip>
+          <a:stretch>
+            <a:fillRect/>
+          </a:stretch>
+        </p:blipFill>
+        <p:spPr>
+          <a:xfrm>
+            <a:off x="6096000" y="2457773"/>
+            <a:ext cx="5288538" cy="2644269"/>
+          </a:xfrm>
+          <a:prstGeom prst="rect">
+            <a:avLst/>
+          </a:prstGeom>
+        </p:spPr>
+      </p:pic>
     </p:spTree>
     <p:extLst>
       <p:ext uri="{BB962C8B-B14F-4D97-AF65-F5344CB8AC3E}">
@@ -6515,13 +6577,8 @@
             <a:pPr lvl="1"/>
             <a:r>
               <a:rPr lang="en-US" sz="3200" dirty="0"/>
-              <a:t>Front End:	HTML, CSS, JS, Bootstrap, </a:t>
-            </a:r>
-            <a:r>
-              <a:rPr lang="en-US" sz="3200" dirty="0" err="1"/>
-              <a:t>JQuery</a:t>
-            </a:r>
-            <a:endParaRPr lang="en-US" sz="3200" dirty="0"/>
+              <a:t>Front End:	HTML, CSS, JS, Bootstrap, jQuery</a:t>
+            </a:r>
           </a:p>
           <a:p>
             <a:pPr lvl="1"/>
@@ -6955,6 +7012,71 @@
     <p:extLst>
       <p:ext uri="{BB962C8B-B14F-4D97-AF65-F5344CB8AC3E}">
         <p14:creationId xmlns:p14="http://schemas.microsoft.com/office/powerpoint/2010/main" val="287066997"/>
+      </p:ext>
+    </p:extLst>
+  </p:cSld>
+  <p:clrMapOvr>
+    <a:masterClrMapping/>
+  </p:clrMapOvr>
+</p:sld>
+</file>
+
+<file path=ppt/slides/slide6.xml><?xml version="1.0" encoding="utf-8"?>
+<p:sld xmlns:a="http://schemas.openxmlformats.org/drawingml/2006/main" xmlns:r="http://schemas.openxmlformats.org/officeDocument/2006/relationships" xmlns:p="http://schemas.openxmlformats.org/presentationml/2006/main">
+  <p:cSld>
+    <p:spTree>
+      <p:nvGrpSpPr>
+        <p:cNvPr id="1" name=""/>
+        <p:cNvGrpSpPr/>
+        <p:nvPr/>
+      </p:nvGrpSpPr>
+      <p:grpSpPr>
+        <a:xfrm>
+          <a:off x="0" y="0"/>
+          <a:ext cx="0" cy="0"/>
+          <a:chOff x="0" y="0"/>
+          <a:chExt cx="0" cy="0"/>
+        </a:xfrm>
+      </p:grpSpPr>
+      <p:sp>
+        <p:nvSpPr>
+          <p:cNvPr id="2" name="Title 1">
+            <a:extLst>
+              <a:ext uri="{FF2B5EF4-FFF2-40B4-BE49-F238E27FC236}">
+                <a16:creationId xmlns:a16="http://schemas.microsoft.com/office/drawing/2014/main" id="{5C896680-1C8F-4F0B-9EB0-417BAF1060B6}"/>
+              </a:ext>
+            </a:extLst>
+          </p:cNvPr>
+          <p:cNvSpPr>
+            <a:spLocks noGrp="1"/>
+          </p:cNvSpPr>
+          <p:nvPr>
+            <p:ph type="title"/>
+          </p:nvPr>
+        </p:nvSpPr>
+        <p:spPr>
+          <a:xfrm>
+            <a:off x="114574" y="2481432"/>
+            <a:ext cx="12656321" cy="1752599"/>
+          </a:xfrm>
+        </p:spPr>
+        <p:txBody>
+          <a:bodyPr>
+            <a:noAutofit/>
+          </a:bodyPr>
+          <a:lstStyle/>
+          <a:p>
+            <a:r>
+              <a:rPr lang="en-US" sz="10000" dirty="0"/>
+              <a:t>Demo &amp; Questions</a:t>
+            </a:r>
+          </a:p>
+        </p:txBody>
+      </p:sp>
+    </p:spTree>
+    <p:extLst>
+      <p:ext uri="{BB962C8B-B14F-4D97-AF65-F5344CB8AC3E}">
+        <p14:creationId xmlns:p14="http://schemas.microsoft.com/office/powerpoint/2010/main" val="1796013003"/>
       </p:ext>
     </p:extLst>
   </p:cSld>

</xml_diff>